<commit_message>
Changed and Added files
</commit_message>
<xml_diff>
--- a/5_documentation/Presentation _Michael_Sheppard.pptx
+++ b/5_documentation/Presentation _Michael_Sheppard.pptx
@@ -5,7 +5,7 @@
     <p:sldMasterId id="2147483815" r:id="rId1"/>
   </p:sldMasterIdLst>
   <p:notesMasterIdLst>
-    <p:notesMasterId r:id="rId7"/>
+    <p:notesMasterId r:id="rId8"/>
   </p:notesMasterIdLst>
   <p:sldIdLst>
     <p:sldId id="256" r:id="rId2"/>
@@ -13,6 +13,7 @@
     <p:sldId id="257" r:id="rId4"/>
     <p:sldId id="259" r:id="rId5"/>
     <p:sldId id="260" r:id="rId6"/>
+    <p:sldId id="261" r:id="rId7"/>
   </p:sldIdLst>
   <p:sldSz cx="12192000" cy="6858000"/>
   <p:notesSz cx="6858000" cy="9144000"/>
@@ -7725,22 +7726,120 @@
             <p:ph type="title"/>
           </p:nvPr>
         </p:nvSpPr>
-        <p:spPr/>
+        <p:spPr>
+          <a:xfrm>
+            <a:off x="1337836" y="-110067"/>
+            <a:ext cx="8825657" cy="1915647"/>
+          </a:xfrm>
+        </p:spPr>
         <p:txBody>
           <a:bodyPr/>
           <a:lstStyle/>
           <a:p>
             <a:r>
               <a:rPr lang="en-US" dirty="0"/>
-              <a:t>Demonstration</a:t>
-            </a:r>
-          </a:p>
-        </p:txBody>
-      </p:sp>
+              <a:t>Roadmap</a:t>
+            </a:r>
+          </a:p>
+        </p:txBody>
+      </p:sp>
+      <p:pic>
+        <p:nvPicPr>
+          <p:cNvPr id="8" name="Picture 7" descr="Timeline&#10;&#10;Description automatically generated">
+            <a:extLst>
+              <a:ext uri="{FF2B5EF4-FFF2-40B4-BE49-F238E27FC236}">
+                <a16:creationId xmlns:a16="http://schemas.microsoft.com/office/drawing/2014/main" id="{75567CEC-0CA3-E7C9-3667-F948F7FDC39A}"/>
+              </a:ext>
+            </a:extLst>
+          </p:cNvPr>
+          <p:cNvPicPr>
+            <a:picLocks noChangeAspect="1"/>
+          </p:cNvPicPr>
+          <p:nvPr/>
+        </p:nvPicPr>
+        <p:blipFill rotWithShape="1">
+          <a:blip r:embed="rId2">
+            <a:extLst>
+              <a:ext uri="{28A0092B-C50C-407E-A947-70E740481C1C}">
+                <a14:useLocalDpi xmlns:a14="http://schemas.microsoft.com/office/drawing/2010/main" val="0"/>
+              </a:ext>
+            </a:extLst>
+          </a:blip>
+          <a:srcRect l="7280" t="12667"/>
+          <a:stretch/>
+        </p:blipFill>
+        <p:spPr>
+          <a:xfrm>
+            <a:off x="1215916" y="2611786"/>
+            <a:ext cx="9526270" cy="2994660"/>
+          </a:xfrm>
+          <a:prstGeom prst="rect">
+            <a:avLst/>
+          </a:prstGeom>
+        </p:spPr>
+      </p:pic>
     </p:spTree>
     <p:extLst>
       <p:ext uri="{BB962C8B-B14F-4D97-AF65-F5344CB8AC3E}">
         <p14:creationId xmlns:p14="http://schemas.microsoft.com/office/powerpoint/2010/main" val="71013968"/>
+      </p:ext>
+    </p:extLst>
+  </p:cSld>
+  <p:clrMapOvr>
+    <a:masterClrMapping/>
+  </p:clrMapOvr>
+</p:sld>
+</file>
+
+<file path=ppt/slides/slide6.xml><?xml version="1.0" encoding="utf-8"?>
+<p:sld xmlns:a="http://schemas.openxmlformats.org/drawingml/2006/main" xmlns:r="http://schemas.openxmlformats.org/officeDocument/2006/relationships" xmlns:p="http://schemas.openxmlformats.org/presentationml/2006/main">
+  <p:cSld>
+    <p:spTree>
+      <p:nvGrpSpPr>
+        <p:cNvPr id="1" name=""/>
+        <p:cNvGrpSpPr/>
+        <p:nvPr/>
+      </p:nvGrpSpPr>
+      <p:grpSpPr>
+        <a:xfrm>
+          <a:off x="0" y="0"/>
+          <a:ext cx="0" cy="0"/>
+          <a:chOff x="0" y="0"/>
+          <a:chExt cx="0" cy="0"/>
+        </a:xfrm>
+      </p:grpSpPr>
+      <p:sp>
+        <p:nvSpPr>
+          <p:cNvPr id="2" name="Title 1">
+            <a:extLst>
+              <a:ext uri="{FF2B5EF4-FFF2-40B4-BE49-F238E27FC236}">
+                <a16:creationId xmlns:a16="http://schemas.microsoft.com/office/drawing/2014/main" id="{6862A182-0B1A-4D95-8BE4-2CF800C925BA}"/>
+              </a:ext>
+            </a:extLst>
+          </p:cNvPr>
+          <p:cNvSpPr>
+            <a:spLocks noGrp="1"/>
+          </p:cNvSpPr>
+          <p:nvPr>
+            <p:ph type="title"/>
+          </p:nvPr>
+        </p:nvSpPr>
+        <p:spPr/>
+        <p:txBody>
+          <a:bodyPr/>
+          <a:lstStyle/>
+          <a:p>
+            <a:r>
+              <a:rPr lang="en-US" dirty="0"/>
+              <a:t>Demonstration</a:t>
+            </a:r>
+          </a:p>
+        </p:txBody>
+      </p:sp>
+    </p:spTree>
+    <p:extLst>
+      <p:ext uri="{BB962C8B-B14F-4D97-AF65-F5344CB8AC3E}">
+        <p14:creationId xmlns:p14="http://schemas.microsoft.com/office/powerpoint/2010/main" val="3516735352"/>
       </p:ext>
     </p:extLst>
   </p:cSld>

</xml_diff>